<commit_message>
added pdf of presentation
</commit_message>
<xml_diff>
--- a/proj1/Revature Project 1.pptx
+++ b/proj1/Revature Project 1.pptx
@@ -3644,6 +3644,171 @@
           </a:p>
         </p:txBody>
       </p:sp>
+      <p:sp>
+        <p:nvSpPr>
+          <p:cNvPr id="3" name="Rectangle: Rounded Corners 2">
+            <a:extLst>
+              <a:ext uri="{FF2B5EF4-FFF2-40B4-BE49-F238E27FC236}">
+                <a16:creationId xmlns:a16="http://schemas.microsoft.com/office/drawing/2014/main" id="{2ECC8A00-854B-42DE-826C-5262240C2320}"/>
+              </a:ext>
+            </a:extLst>
+          </p:cNvPr>
+          <p:cNvSpPr/>
+          <p:nvPr/>
+        </p:nvSpPr>
+        <p:spPr>
+          <a:xfrm>
+            <a:off x="8005821" y="3239735"/>
+            <a:ext cx="325206" cy="141560"/>
+          </a:xfrm>
+          <a:prstGeom prst="roundRect">
+            <a:avLst/>
+          </a:prstGeom>
+          <a:solidFill>
+            <a:schemeClr val="accent3">
+              <a:lumMod val="60000"/>
+              <a:lumOff val="40000"/>
+            </a:schemeClr>
+          </a:solidFill>
+          <a:effectLst>
+            <a:softEdge rad="31750"/>
+          </a:effectLst>
+        </p:spPr>
+        <p:style>
+          <a:lnRef idx="2">
+            <a:schemeClr val="accent1">
+              <a:shade val="50000"/>
+            </a:schemeClr>
+          </a:lnRef>
+          <a:fillRef idx="1">
+            <a:schemeClr val="accent1"/>
+          </a:fillRef>
+          <a:effectRef idx="0">
+            <a:schemeClr val="accent1"/>
+          </a:effectRef>
+          <a:fontRef idx="minor">
+            <a:schemeClr val="lt1"/>
+          </a:fontRef>
+        </p:style>
+        <p:txBody>
+          <a:bodyPr rtlCol="0" anchor="ctr"/>
+          <a:lstStyle/>
+          <a:p>
+            <a:pPr algn="ctr"/>
+            <a:endParaRPr lang="en-US"/>
+          </a:p>
+        </p:txBody>
+      </p:sp>
+      <p:sp>
+        <p:nvSpPr>
+          <p:cNvPr id="6" name="Rectangle: Rounded Corners 5">
+            <a:extLst>
+              <a:ext uri="{FF2B5EF4-FFF2-40B4-BE49-F238E27FC236}">
+                <a16:creationId xmlns:a16="http://schemas.microsoft.com/office/drawing/2014/main" id="{35C84824-4746-4BA5-BEF8-182DFAB03F71}"/>
+              </a:ext>
+            </a:extLst>
+          </p:cNvPr>
+          <p:cNvSpPr/>
+          <p:nvPr/>
+        </p:nvSpPr>
+        <p:spPr>
+          <a:xfrm>
+            <a:off x="8009007" y="3392135"/>
+            <a:ext cx="325206" cy="141560"/>
+          </a:xfrm>
+          <a:prstGeom prst="roundRect">
+            <a:avLst/>
+          </a:prstGeom>
+          <a:solidFill>
+            <a:schemeClr val="accent3">
+              <a:lumMod val="60000"/>
+              <a:lumOff val="40000"/>
+            </a:schemeClr>
+          </a:solidFill>
+          <a:effectLst>
+            <a:softEdge rad="31750"/>
+          </a:effectLst>
+        </p:spPr>
+        <p:style>
+          <a:lnRef idx="2">
+            <a:schemeClr val="accent1">
+              <a:shade val="50000"/>
+            </a:schemeClr>
+          </a:lnRef>
+          <a:fillRef idx="1">
+            <a:schemeClr val="accent1"/>
+          </a:fillRef>
+          <a:effectRef idx="0">
+            <a:schemeClr val="accent1"/>
+          </a:effectRef>
+          <a:fontRef idx="minor">
+            <a:schemeClr val="lt1"/>
+          </a:fontRef>
+        </p:style>
+        <p:txBody>
+          <a:bodyPr rtlCol="0" anchor="ctr"/>
+          <a:lstStyle/>
+          <a:p>
+            <a:pPr algn="ctr"/>
+            <a:endParaRPr lang="en-US"/>
+          </a:p>
+        </p:txBody>
+      </p:sp>
+      <p:sp>
+        <p:nvSpPr>
+          <p:cNvPr id="12" name="Rectangle: Rounded Corners 11">
+            <a:extLst>
+              <a:ext uri="{FF2B5EF4-FFF2-40B4-BE49-F238E27FC236}">
+                <a16:creationId xmlns:a16="http://schemas.microsoft.com/office/drawing/2014/main" id="{1B2FE81F-D6BE-4276-A3ED-6F4DBF5DAAC3}"/>
+              </a:ext>
+            </a:extLst>
+          </p:cNvPr>
+          <p:cNvSpPr/>
+          <p:nvPr/>
+        </p:nvSpPr>
+        <p:spPr>
+          <a:xfrm>
+            <a:off x="8008367" y="3548361"/>
+            <a:ext cx="325206" cy="141560"/>
+          </a:xfrm>
+          <a:prstGeom prst="roundRect">
+            <a:avLst/>
+          </a:prstGeom>
+          <a:solidFill>
+            <a:schemeClr val="accent3">
+              <a:lumMod val="60000"/>
+              <a:lumOff val="40000"/>
+            </a:schemeClr>
+          </a:solidFill>
+          <a:effectLst>
+            <a:softEdge rad="31750"/>
+          </a:effectLst>
+        </p:spPr>
+        <p:style>
+          <a:lnRef idx="2">
+            <a:schemeClr val="accent1">
+              <a:shade val="50000"/>
+            </a:schemeClr>
+          </a:lnRef>
+          <a:fillRef idx="1">
+            <a:schemeClr val="accent1"/>
+          </a:fillRef>
+          <a:effectRef idx="0">
+            <a:schemeClr val="accent1"/>
+          </a:effectRef>
+          <a:fontRef idx="minor">
+            <a:schemeClr val="lt1"/>
+          </a:fontRef>
+        </p:style>
+        <p:txBody>
+          <a:bodyPr rtlCol="0" anchor="ctr"/>
+          <a:lstStyle/>
+          <a:p>
+            <a:pPr algn="ctr"/>
+            <a:endParaRPr lang="en-US"/>
+          </a:p>
+        </p:txBody>
+      </p:sp>
     </p:spTree>
     <p:extLst>
       <p:ext uri="{BB962C8B-B14F-4D97-AF65-F5344CB8AC3E}">
@@ -4420,6 +4585,171 @@
           </a:prstGeom>
         </p:spPr>
       </p:pic>
+      <p:sp>
+        <p:nvSpPr>
+          <p:cNvPr id="3" name="Rectangle: Rounded Corners 2">
+            <a:extLst>
+              <a:ext uri="{FF2B5EF4-FFF2-40B4-BE49-F238E27FC236}">
+                <a16:creationId xmlns:a16="http://schemas.microsoft.com/office/drawing/2014/main" id="{AF47B112-6BBA-4EC5-80F3-66CF8D70F3CA}"/>
+              </a:ext>
+            </a:extLst>
+          </p:cNvPr>
+          <p:cNvSpPr/>
+          <p:nvPr/>
+        </p:nvSpPr>
+        <p:spPr>
+          <a:xfrm>
+            <a:off x="1995546" y="5497160"/>
+            <a:ext cx="325206" cy="141560"/>
+          </a:xfrm>
+          <a:prstGeom prst="roundRect">
+            <a:avLst/>
+          </a:prstGeom>
+          <a:solidFill>
+            <a:schemeClr val="accent3">
+              <a:lumMod val="60000"/>
+              <a:lumOff val="40000"/>
+            </a:schemeClr>
+          </a:solidFill>
+          <a:effectLst>
+            <a:softEdge rad="31750"/>
+          </a:effectLst>
+        </p:spPr>
+        <p:style>
+          <a:lnRef idx="2">
+            <a:schemeClr val="accent1">
+              <a:shade val="50000"/>
+            </a:schemeClr>
+          </a:lnRef>
+          <a:fillRef idx="1">
+            <a:schemeClr val="accent1"/>
+          </a:fillRef>
+          <a:effectRef idx="0">
+            <a:schemeClr val="accent1"/>
+          </a:effectRef>
+          <a:fontRef idx="minor">
+            <a:schemeClr val="lt1"/>
+          </a:fontRef>
+        </p:style>
+        <p:txBody>
+          <a:bodyPr rtlCol="0" anchor="ctr"/>
+          <a:lstStyle/>
+          <a:p>
+            <a:pPr algn="ctr"/>
+            <a:endParaRPr lang="en-US"/>
+          </a:p>
+        </p:txBody>
+      </p:sp>
+      <p:sp>
+        <p:nvSpPr>
+          <p:cNvPr id="5" name="Rectangle: Rounded Corners 4">
+            <a:extLst>
+              <a:ext uri="{FF2B5EF4-FFF2-40B4-BE49-F238E27FC236}">
+                <a16:creationId xmlns:a16="http://schemas.microsoft.com/office/drawing/2014/main" id="{765EA234-6200-4C32-9E5F-A6E59E5962D2}"/>
+              </a:ext>
+            </a:extLst>
+          </p:cNvPr>
+          <p:cNvSpPr/>
+          <p:nvPr/>
+        </p:nvSpPr>
+        <p:spPr>
+          <a:xfrm>
+            <a:off x="1989207" y="5640035"/>
+            <a:ext cx="325206" cy="141560"/>
+          </a:xfrm>
+          <a:prstGeom prst="roundRect">
+            <a:avLst/>
+          </a:prstGeom>
+          <a:solidFill>
+            <a:schemeClr val="accent3">
+              <a:lumMod val="60000"/>
+              <a:lumOff val="40000"/>
+            </a:schemeClr>
+          </a:solidFill>
+          <a:effectLst>
+            <a:softEdge rad="31750"/>
+          </a:effectLst>
+        </p:spPr>
+        <p:style>
+          <a:lnRef idx="2">
+            <a:schemeClr val="accent1">
+              <a:shade val="50000"/>
+            </a:schemeClr>
+          </a:lnRef>
+          <a:fillRef idx="1">
+            <a:schemeClr val="accent1"/>
+          </a:fillRef>
+          <a:effectRef idx="0">
+            <a:schemeClr val="accent1"/>
+          </a:effectRef>
+          <a:fontRef idx="minor">
+            <a:schemeClr val="lt1"/>
+          </a:fontRef>
+        </p:style>
+        <p:txBody>
+          <a:bodyPr rtlCol="0" anchor="ctr"/>
+          <a:lstStyle/>
+          <a:p>
+            <a:pPr algn="ctr"/>
+            <a:endParaRPr lang="en-US"/>
+          </a:p>
+        </p:txBody>
+      </p:sp>
+      <p:sp>
+        <p:nvSpPr>
+          <p:cNvPr id="12" name="Rectangle: Rounded Corners 11">
+            <a:extLst>
+              <a:ext uri="{FF2B5EF4-FFF2-40B4-BE49-F238E27FC236}">
+                <a16:creationId xmlns:a16="http://schemas.microsoft.com/office/drawing/2014/main" id="{6D5ED274-E349-4EBA-A0D3-A700716462B0}"/>
+              </a:ext>
+            </a:extLst>
+          </p:cNvPr>
+          <p:cNvSpPr/>
+          <p:nvPr/>
+        </p:nvSpPr>
+        <p:spPr>
+          <a:xfrm>
+            <a:off x="1998092" y="5777211"/>
+            <a:ext cx="325206" cy="141560"/>
+          </a:xfrm>
+          <a:prstGeom prst="roundRect">
+            <a:avLst/>
+          </a:prstGeom>
+          <a:solidFill>
+            <a:schemeClr val="accent3">
+              <a:lumMod val="60000"/>
+              <a:lumOff val="40000"/>
+            </a:schemeClr>
+          </a:solidFill>
+          <a:effectLst>
+            <a:softEdge rad="31750"/>
+          </a:effectLst>
+        </p:spPr>
+        <p:style>
+          <a:lnRef idx="2">
+            <a:schemeClr val="accent1">
+              <a:shade val="50000"/>
+            </a:schemeClr>
+          </a:lnRef>
+          <a:fillRef idx="1">
+            <a:schemeClr val="accent1"/>
+          </a:fillRef>
+          <a:effectRef idx="0">
+            <a:schemeClr val="accent1"/>
+          </a:effectRef>
+          <a:fontRef idx="minor">
+            <a:schemeClr val="lt1"/>
+          </a:fontRef>
+        </p:style>
+        <p:txBody>
+          <a:bodyPr rtlCol="0" anchor="ctr"/>
+          <a:lstStyle/>
+          <a:p>
+            <a:pPr algn="ctr"/>
+            <a:endParaRPr lang="en-US"/>
+          </a:p>
+        </p:txBody>
+      </p:sp>
     </p:spTree>
     <p:extLst>
       <p:ext uri="{BB962C8B-B14F-4D97-AF65-F5344CB8AC3E}">
@@ -5853,6 +6183,116 @@
           </a:p>
         </p:txBody>
       </p:sp>
+      <p:sp>
+        <p:nvSpPr>
+          <p:cNvPr id="5" name="Rectangle: Rounded Corners 4">
+            <a:extLst>
+              <a:ext uri="{FF2B5EF4-FFF2-40B4-BE49-F238E27FC236}">
+                <a16:creationId xmlns:a16="http://schemas.microsoft.com/office/drawing/2014/main" id="{360CE5C3-2601-40CD-BB0E-14569ABECE3F}"/>
+              </a:ext>
+            </a:extLst>
+          </p:cNvPr>
+          <p:cNvSpPr/>
+          <p:nvPr/>
+        </p:nvSpPr>
+        <p:spPr>
+          <a:xfrm>
+            <a:off x="4532382" y="2734910"/>
+            <a:ext cx="325206" cy="141560"/>
+          </a:xfrm>
+          <a:prstGeom prst="roundRect">
+            <a:avLst/>
+          </a:prstGeom>
+          <a:solidFill>
+            <a:schemeClr val="accent3">
+              <a:lumMod val="60000"/>
+              <a:lumOff val="40000"/>
+            </a:schemeClr>
+          </a:solidFill>
+          <a:effectLst>
+            <a:softEdge rad="31750"/>
+          </a:effectLst>
+        </p:spPr>
+        <p:style>
+          <a:lnRef idx="2">
+            <a:schemeClr val="accent1">
+              <a:shade val="50000"/>
+            </a:schemeClr>
+          </a:lnRef>
+          <a:fillRef idx="1">
+            <a:schemeClr val="accent1"/>
+          </a:fillRef>
+          <a:effectRef idx="0">
+            <a:schemeClr val="accent1"/>
+          </a:effectRef>
+          <a:fontRef idx="minor">
+            <a:schemeClr val="lt1"/>
+          </a:fontRef>
+        </p:style>
+        <p:txBody>
+          <a:bodyPr rtlCol="0" anchor="ctr"/>
+          <a:lstStyle/>
+          <a:p>
+            <a:pPr algn="ctr"/>
+            <a:endParaRPr lang="en-US"/>
+          </a:p>
+        </p:txBody>
+      </p:sp>
+      <p:sp>
+        <p:nvSpPr>
+          <p:cNvPr id="6" name="Rectangle: Rounded Corners 5">
+            <a:extLst>
+              <a:ext uri="{FF2B5EF4-FFF2-40B4-BE49-F238E27FC236}">
+                <a16:creationId xmlns:a16="http://schemas.microsoft.com/office/drawing/2014/main" id="{D37A1FF9-67BD-41BD-B272-EF92FE1A393E}"/>
+              </a:ext>
+            </a:extLst>
+          </p:cNvPr>
+          <p:cNvSpPr/>
+          <p:nvPr/>
+        </p:nvSpPr>
+        <p:spPr>
+          <a:xfrm>
+            <a:off x="4522217" y="2881611"/>
+            <a:ext cx="325206" cy="141560"/>
+          </a:xfrm>
+          <a:prstGeom prst="roundRect">
+            <a:avLst/>
+          </a:prstGeom>
+          <a:solidFill>
+            <a:schemeClr val="accent3">
+              <a:lumMod val="60000"/>
+              <a:lumOff val="40000"/>
+            </a:schemeClr>
+          </a:solidFill>
+          <a:effectLst>
+            <a:softEdge rad="31750"/>
+          </a:effectLst>
+        </p:spPr>
+        <p:style>
+          <a:lnRef idx="2">
+            <a:schemeClr val="accent1">
+              <a:shade val="50000"/>
+            </a:schemeClr>
+          </a:lnRef>
+          <a:fillRef idx="1">
+            <a:schemeClr val="accent1"/>
+          </a:fillRef>
+          <a:effectRef idx="0">
+            <a:schemeClr val="accent1"/>
+          </a:effectRef>
+          <a:fontRef idx="minor">
+            <a:schemeClr val="lt1"/>
+          </a:fontRef>
+        </p:style>
+        <p:txBody>
+          <a:bodyPr rtlCol="0" anchor="ctr"/>
+          <a:lstStyle/>
+          <a:p>
+            <a:pPr algn="ctr"/>
+            <a:endParaRPr lang="en-US"/>
+          </a:p>
+        </p:txBody>
+      </p:sp>
     </p:spTree>
     <p:extLst>
       <p:ext uri="{BB962C8B-B14F-4D97-AF65-F5344CB8AC3E}">
@@ -6159,8 +6599,8 @@
           </a:prstGeom>
         </p:spPr>
       </p:pic>
-      <mc:AlternateContent xmlns:mc="http://schemas.openxmlformats.org/markup-compatibility/2006">
-        <mc:Choice xmlns:a14="http://schemas.microsoft.com/office/drawing/2010/main" Requires="a14">
+      <mc:AlternateContent xmlns:mc="http://schemas.openxmlformats.org/markup-compatibility/2006" xmlns:a14="http://schemas.microsoft.com/office/drawing/2010/main">
+        <mc:Choice Requires="a14">
           <p:sp>
             <p:nvSpPr>
               <p:cNvPr id="9" name="TextBox 8">
@@ -6237,7 +6677,7 @@
             </p:txBody>
           </p:sp>
         </mc:Choice>
-        <mc:Fallback>
+        <mc:Fallback xmlns="">
           <p:sp>
             <p:nvSpPr>
               <p:cNvPr id="9" name="TextBox 8">
@@ -6426,8 +6866,8 @@
           </a:p>
         </p:txBody>
       </p:sp>
-      <mc:AlternateContent xmlns:mc="http://schemas.openxmlformats.org/markup-compatibility/2006">
-        <mc:Choice xmlns:a14="http://schemas.microsoft.com/office/drawing/2010/main" Requires="a14">
+      <mc:AlternateContent xmlns:mc="http://schemas.openxmlformats.org/markup-compatibility/2006" xmlns:a14="http://schemas.microsoft.com/office/drawing/2010/main">
+        <mc:Choice Requires="a14">
           <p:sp>
             <p:nvSpPr>
               <p:cNvPr id="9" name="TextBox 8">
@@ -6504,7 +6944,7 @@
             </p:txBody>
           </p:sp>
         </mc:Choice>
-        <mc:Fallback>
+        <mc:Fallback xmlns="">
           <p:sp>
             <p:nvSpPr>
               <p:cNvPr id="9" name="TextBox 8">
@@ -6907,8 +7347,8 @@
           </a:p>
         </p:txBody>
       </p:sp>
-      <mc:AlternateContent xmlns:mc="http://schemas.openxmlformats.org/markup-compatibility/2006">
-        <mc:Choice xmlns:a14="http://schemas.microsoft.com/office/drawing/2010/main" Requires="a14">
+      <mc:AlternateContent xmlns:mc="http://schemas.openxmlformats.org/markup-compatibility/2006" xmlns:a14="http://schemas.microsoft.com/office/drawing/2010/main">
+        <mc:Choice Requires="a14">
           <p:sp>
             <p:nvSpPr>
               <p:cNvPr id="15" name="TextBox 14">
@@ -6985,7 +7425,7 @@
             </p:txBody>
           </p:sp>
         </mc:Choice>
-        <mc:Fallback>
+        <mc:Fallback xmlns="">
           <p:sp>
             <p:nvSpPr>
               <p:cNvPr id="15" name="TextBox 14">
@@ -7068,8 +7508,8 @@
           </a:p>
         </p:txBody>
       </p:sp>
-      <mc:AlternateContent xmlns:mc="http://schemas.openxmlformats.org/markup-compatibility/2006">
-        <mc:Choice xmlns:a14="http://schemas.microsoft.com/office/drawing/2010/main" Requires="a14">
+      <mc:AlternateContent xmlns:mc="http://schemas.openxmlformats.org/markup-compatibility/2006" xmlns:a14="http://schemas.microsoft.com/office/drawing/2010/main">
+        <mc:Choice Requires="a14">
           <p:sp>
             <p:nvSpPr>
               <p:cNvPr id="19" name="TextBox 18">
@@ -7146,7 +7586,7 @@
             </p:txBody>
           </p:sp>
         </mc:Choice>
-        <mc:Fallback>
+        <mc:Fallback xmlns="">
           <p:sp>
             <p:nvSpPr>
               <p:cNvPr id="19" name="TextBox 18">
@@ -7191,8 +7631,8 @@
           </p:sp>
         </mc:Fallback>
       </mc:AlternateContent>
-      <mc:AlternateContent xmlns:mc="http://schemas.openxmlformats.org/markup-compatibility/2006">
-        <mc:Choice xmlns:a14="http://schemas.microsoft.com/office/drawing/2010/main" Requires="a14">
+      <mc:AlternateContent xmlns:mc="http://schemas.openxmlformats.org/markup-compatibility/2006" xmlns:a14="http://schemas.microsoft.com/office/drawing/2010/main">
+        <mc:Choice Requires="a14">
           <p:sp>
             <p:nvSpPr>
               <p:cNvPr id="21" name="TextBox 20">
@@ -7269,7 +7709,7 @@
             </p:txBody>
           </p:sp>
         </mc:Choice>
-        <mc:Fallback>
+        <mc:Fallback xmlns="">
           <p:sp>
             <p:nvSpPr>
               <p:cNvPr id="21" name="TextBox 20">
@@ -7352,8 +7792,8 @@
           </a:p>
         </p:txBody>
       </p:sp>
-      <mc:AlternateContent xmlns:mc="http://schemas.openxmlformats.org/markup-compatibility/2006">
-        <mc:Choice xmlns:a14="http://schemas.microsoft.com/office/drawing/2010/main" Requires="a14">
+      <mc:AlternateContent xmlns:mc="http://schemas.openxmlformats.org/markup-compatibility/2006" xmlns:a14="http://schemas.microsoft.com/office/drawing/2010/main">
+        <mc:Choice Requires="a14">
           <p:sp>
             <p:nvSpPr>
               <p:cNvPr id="25" name="TextBox 24">
@@ -7430,7 +7870,7 @@
             </p:txBody>
           </p:sp>
         </mc:Choice>
-        <mc:Fallback>
+        <mc:Fallback xmlns="">
           <p:sp>
             <p:nvSpPr>
               <p:cNvPr id="25" name="TextBox 24">
@@ -7475,8 +7915,8 @@
           </p:sp>
         </mc:Fallback>
       </mc:AlternateContent>
-      <mc:AlternateContent xmlns:mc="http://schemas.openxmlformats.org/markup-compatibility/2006">
-        <mc:Choice xmlns:a14="http://schemas.microsoft.com/office/drawing/2010/main" Requires="a14">
+      <mc:AlternateContent xmlns:mc="http://schemas.openxmlformats.org/markup-compatibility/2006" xmlns:a14="http://schemas.microsoft.com/office/drawing/2010/main">
+        <mc:Choice Requires="a14">
           <p:sp>
             <p:nvSpPr>
               <p:cNvPr id="27" name="TextBox 26">
@@ -7553,7 +7993,7 @@
             </p:txBody>
           </p:sp>
         </mc:Choice>
-        <mc:Fallback>
+        <mc:Fallback xmlns="">
           <p:sp>
             <p:nvSpPr>
               <p:cNvPr id="27" name="TextBox 26">
@@ -7636,8 +8076,8 @@
           </a:p>
         </p:txBody>
       </p:sp>
-      <mc:AlternateContent xmlns:mc="http://schemas.openxmlformats.org/markup-compatibility/2006">
-        <mc:Choice xmlns:a14="http://schemas.microsoft.com/office/drawing/2010/main" Requires="a14">
+      <mc:AlternateContent xmlns:mc="http://schemas.openxmlformats.org/markup-compatibility/2006" xmlns:a14="http://schemas.microsoft.com/office/drawing/2010/main">
+        <mc:Choice Requires="a14">
           <p:sp>
             <p:nvSpPr>
               <p:cNvPr id="31" name="TextBox 30">
@@ -7714,7 +8154,7 @@
             </p:txBody>
           </p:sp>
         </mc:Choice>
-        <mc:Fallback>
+        <mc:Fallback xmlns="">
           <p:sp>
             <p:nvSpPr>
               <p:cNvPr id="31" name="TextBox 30">
@@ -8964,612 +9404,8 @@
           </a:prstGeom>
         </p:spPr>
       </p:pic>
-      <mc:AlternateContent xmlns:mc="http://schemas.openxmlformats.org/markup-compatibility/2006">
-        <mc:Choice xmlns:a14="http://schemas.microsoft.com/office/drawing/2010/main" Requires="a14">
-          <p:sp>
-            <p:nvSpPr>
-              <p:cNvPr id="3" name="TextBox 2">
-                <a:extLst>
-                  <a:ext uri="{FF2B5EF4-FFF2-40B4-BE49-F238E27FC236}">
-                    <a16:creationId xmlns:a16="http://schemas.microsoft.com/office/drawing/2014/main" id="{44D73A6A-B44D-4858-A7A5-FDFFB65723E5}"/>
-                  </a:ext>
-                </a:extLst>
-              </p:cNvPr>
-              <p:cNvSpPr txBox="1"/>
-              <p:nvPr/>
-            </p:nvSpPr>
-            <p:spPr>
-              <a:xfrm>
-                <a:off x="838200" y="4708763"/>
-                <a:ext cx="5817170" cy="409151"/>
-              </a:xfrm>
-              <a:prstGeom prst="rect">
-                <a:avLst/>
-              </a:prstGeom>
-              <a:noFill/>
-            </p:spPr>
-            <p:txBody>
-              <a:bodyPr wrap="none" lIns="0" tIns="0" rIns="0" bIns="0" rtlCol="0">
-                <a:spAutoFit/>
-              </a:bodyPr>
-              <a:lstStyle/>
-              <a:p>
-                <a14:m>
-                  <m:oMathPara xmlns:m="http://schemas.openxmlformats.org/officeDocument/2006/math">
-                    <m:oMathParaPr>
-                      <m:jc m:val="centerGroup"/>
-                    </m:oMathParaPr>
-                    <m:oMath xmlns:m="http://schemas.openxmlformats.org/officeDocument/2006/math">
-                      <m:f>
-                        <m:fPr>
-                          <m:ctrlPr>
-                            <a:rPr lang="en-US" sz="1400" i="1" smtClean="0">
-                              <a:latin typeface="Cambria Math" panose="02040503050406030204" pitchFamily="18" charset="0"/>
-                            </a:rPr>
-                          </m:ctrlPr>
-                        </m:fPr>
-                        <m:num>
-                          <m:r>
-                            <a:rPr lang="en-US" sz="1400" b="0" i="1" smtClean="0">
-                              <a:latin typeface="Cambria Math" panose="02040503050406030204" pitchFamily="18" charset="0"/>
-                            </a:rPr>
-                            <m:t>96795.538 </m:t>
-                          </m:r>
-                          <m:r>
-                            <a:rPr lang="en-US" sz="1400" b="0" i="1" smtClean="0">
-                              <a:latin typeface="Cambria Math" panose="02040503050406030204" pitchFamily="18" charset="0"/>
-                            </a:rPr>
-                            <m:t>𝑠𝑒𝑐𝑜𝑛𝑑𝑠</m:t>
-                          </m:r>
-                        </m:num>
-                        <m:den>
-                          <m:r>
-                            <a:rPr lang="en-US" sz="1400" b="0" i="1" smtClean="0">
-                              <a:latin typeface="Cambria Math" panose="02040503050406030204" pitchFamily="18" charset="0"/>
-                            </a:rPr>
-                            <m:t>𝑟𝑒𝑣𝑒𝑟𝑡</m:t>
-                          </m:r>
-                        </m:den>
-                      </m:f>
-                      <m:r>
-                        <a:rPr lang="en-US" sz="1400" b="0" i="1" smtClean="0">
-                          <a:latin typeface="Cambria Math" panose="02040503050406030204" pitchFamily="18" charset="0"/>
-                        </a:rPr>
-                        <m:t> </m:t>
-                      </m:r>
-                      <m:r>
-                        <a:rPr lang="en-US" sz="1400" b="0" i="1" smtClean="0">
-                          <a:latin typeface="Cambria Math" panose="02040503050406030204" pitchFamily="18" charset="0"/>
-                        </a:rPr>
-                        <m:t>𝑥</m:t>
-                      </m:r>
-                      <m:r>
-                        <a:rPr lang="en-US" sz="1400" b="0" i="1" smtClean="0">
-                          <a:latin typeface="Cambria Math" panose="02040503050406030204" pitchFamily="18" charset="0"/>
-                        </a:rPr>
-                        <m:t> </m:t>
-                      </m:r>
-                      <m:f>
-                        <m:fPr>
-                          <m:ctrlPr>
-                            <a:rPr lang="en-US" sz="1400" b="0" i="1" smtClean="0">
-                              <a:latin typeface="Cambria Math" panose="02040503050406030204" pitchFamily="18" charset="0"/>
-                            </a:rPr>
-                          </m:ctrlPr>
-                        </m:fPr>
-                        <m:num>
-                          <m:r>
-                            <a:rPr lang="en-US" sz="1400" b="0" i="1" smtClean="0">
-                              <a:latin typeface="Cambria Math" panose="02040503050406030204" pitchFamily="18" charset="0"/>
-                            </a:rPr>
-                            <m:t>1 </m:t>
-                          </m:r>
-                          <m:r>
-                            <a:rPr lang="en-US" sz="1400" b="0" i="1" smtClean="0">
-                              <a:latin typeface="Cambria Math" panose="02040503050406030204" pitchFamily="18" charset="0"/>
-                            </a:rPr>
-                            <m:t>𝑚𝑖𝑛𝑢𝑡𝑒</m:t>
-                          </m:r>
-                        </m:num>
-                        <m:den>
-                          <m:r>
-                            <a:rPr lang="en-US" sz="1400" b="0" i="1" smtClean="0">
-                              <a:latin typeface="Cambria Math" panose="02040503050406030204" pitchFamily="18" charset="0"/>
-                            </a:rPr>
-                            <m:t>60 </m:t>
-                          </m:r>
-                          <m:r>
-                            <a:rPr lang="en-US" sz="1400" b="0" i="1" smtClean="0">
-                              <a:latin typeface="Cambria Math" panose="02040503050406030204" pitchFamily="18" charset="0"/>
-                            </a:rPr>
-                            <m:t>𝑠𝑒𝑐𝑜𝑛𝑑𝑠</m:t>
-                          </m:r>
-                        </m:den>
-                      </m:f>
-                      <m:r>
-                        <a:rPr lang="en-US" sz="1400" b="0" i="1" smtClean="0">
-                          <a:latin typeface="Cambria Math" panose="02040503050406030204" pitchFamily="18" charset="0"/>
-                        </a:rPr>
-                        <m:t> </m:t>
-                      </m:r>
-                      <m:r>
-                        <a:rPr lang="en-US" sz="1400" b="0" i="1" smtClean="0">
-                          <a:latin typeface="Cambria Math" panose="02040503050406030204" pitchFamily="18" charset="0"/>
-                        </a:rPr>
-                        <m:t>𝑥</m:t>
-                      </m:r>
-                      <m:r>
-                        <a:rPr lang="en-US" sz="1400" b="0" i="1" smtClean="0">
-                          <a:latin typeface="Cambria Math" panose="02040503050406030204" pitchFamily="18" charset="0"/>
-                        </a:rPr>
-                        <m:t> </m:t>
-                      </m:r>
-                      <m:f>
-                        <m:fPr>
-                          <m:ctrlPr>
-                            <a:rPr lang="en-US" sz="1400" b="0" i="1" smtClean="0">
-                              <a:latin typeface="Cambria Math" panose="02040503050406030204" pitchFamily="18" charset="0"/>
-                            </a:rPr>
-                          </m:ctrlPr>
-                        </m:fPr>
-                        <m:num>
-                          <m:r>
-                            <a:rPr lang="en-US" sz="1400" b="0" i="1" smtClean="0">
-                              <a:latin typeface="Cambria Math" panose="02040503050406030204" pitchFamily="18" charset="0"/>
-                            </a:rPr>
-                            <m:t>1 </m:t>
-                          </m:r>
-                          <m:r>
-                            <a:rPr lang="en-US" sz="1400" b="0" i="1" smtClean="0">
-                              <a:latin typeface="Cambria Math" panose="02040503050406030204" pitchFamily="18" charset="0"/>
-                            </a:rPr>
-                            <m:t>h𝑜𝑢𝑟</m:t>
-                          </m:r>
-                        </m:num>
-                        <m:den>
-                          <m:r>
-                            <a:rPr lang="en-US" sz="1400" b="0" i="1" smtClean="0">
-                              <a:latin typeface="Cambria Math" panose="02040503050406030204" pitchFamily="18" charset="0"/>
-                            </a:rPr>
-                            <m:t>60 </m:t>
-                          </m:r>
-                          <m:r>
-                            <a:rPr lang="en-US" sz="1400" b="0" i="1" smtClean="0">
-                              <a:latin typeface="Cambria Math" panose="02040503050406030204" pitchFamily="18" charset="0"/>
-                            </a:rPr>
-                            <m:t>𝑚𝑖𝑛𝑢𝑡𝑒𝑠</m:t>
-                          </m:r>
-                        </m:den>
-                      </m:f>
-                      <m:r>
-                        <a:rPr lang="en-US" sz="1400" b="0" i="1" smtClean="0">
-                          <a:latin typeface="Cambria Math" panose="02040503050406030204" pitchFamily="18" charset="0"/>
-                        </a:rPr>
-                        <m:t> </m:t>
-                      </m:r>
-                      <m:r>
-                        <a:rPr lang="en-US" sz="1400" b="0" i="1" smtClean="0">
-                          <a:latin typeface="Cambria Math" panose="02040503050406030204" pitchFamily="18" charset="0"/>
-                        </a:rPr>
-                        <m:t>𝑥</m:t>
-                      </m:r>
-                      <m:r>
-                        <a:rPr lang="en-US" sz="1400" b="0" i="1" smtClean="0">
-                          <a:latin typeface="Cambria Math" panose="02040503050406030204" pitchFamily="18" charset="0"/>
-                        </a:rPr>
-                        <m:t> </m:t>
-                      </m:r>
-                      <m:f>
-                        <m:fPr>
-                          <m:ctrlPr>
-                            <a:rPr lang="en-US" sz="1400" b="0" i="1" smtClean="0">
-                              <a:latin typeface="Cambria Math" panose="02040503050406030204" pitchFamily="18" charset="0"/>
-                            </a:rPr>
-                          </m:ctrlPr>
-                        </m:fPr>
-                        <m:num>
-                          <m:r>
-                            <a:rPr lang="en-US" sz="1400" b="0" i="1" smtClean="0">
-                              <a:latin typeface="Cambria Math" panose="02040503050406030204" pitchFamily="18" charset="0"/>
-                            </a:rPr>
-                            <m:t>1 </m:t>
-                          </m:r>
-                          <m:r>
-                            <a:rPr lang="en-US" sz="1400" b="0" i="1" smtClean="0">
-                              <a:latin typeface="Cambria Math" panose="02040503050406030204" pitchFamily="18" charset="0"/>
-                            </a:rPr>
-                            <m:t>𝑑𝑎𝑦</m:t>
-                          </m:r>
-                        </m:num>
-                        <m:den>
-                          <m:r>
-                            <a:rPr lang="en-US" sz="1400" b="0" i="1" smtClean="0">
-                              <a:latin typeface="Cambria Math" panose="02040503050406030204" pitchFamily="18" charset="0"/>
-                            </a:rPr>
-                            <m:t>24 </m:t>
-                          </m:r>
-                          <m:r>
-                            <a:rPr lang="en-US" sz="1400" b="0" i="1" smtClean="0">
-                              <a:latin typeface="Cambria Math" panose="02040503050406030204" pitchFamily="18" charset="0"/>
-                            </a:rPr>
-                            <m:t>h𝑜𝑢𝑟𝑠</m:t>
-                          </m:r>
-                        </m:den>
-                      </m:f>
-                      <m:r>
-                        <a:rPr lang="en-US" sz="1400" b="0" i="1" smtClean="0">
-                          <a:latin typeface="Cambria Math" panose="02040503050406030204" pitchFamily="18" charset="0"/>
-                        </a:rPr>
-                        <m:t>= </m:t>
-                      </m:r>
-                      <m:f>
-                        <m:fPr>
-                          <m:ctrlPr>
-                            <a:rPr lang="en-US" sz="1400" b="0" i="1" smtClean="0">
-                              <a:latin typeface="Cambria Math" panose="02040503050406030204" pitchFamily="18" charset="0"/>
-                            </a:rPr>
-                          </m:ctrlPr>
-                        </m:fPr>
-                        <m:num>
-                          <m:r>
-                            <a:rPr lang="en-US" sz="1400" b="0" i="1" smtClean="0">
-                              <a:latin typeface="Cambria Math" panose="02040503050406030204" pitchFamily="18" charset="0"/>
-                            </a:rPr>
-                            <m:t>1.12 </m:t>
-                          </m:r>
-                          <m:r>
-                            <a:rPr lang="en-US" sz="1400" b="0" i="1" smtClean="0">
-                              <a:latin typeface="Cambria Math" panose="02040503050406030204" pitchFamily="18" charset="0"/>
-                            </a:rPr>
-                            <m:t>𝑑𝑎𝑦𝑠</m:t>
-                          </m:r>
-                        </m:num>
-                        <m:den>
-                          <m:r>
-                            <a:rPr lang="en-US" sz="1400" b="0" i="1" smtClean="0">
-                              <a:latin typeface="Cambria Math" panose="02040503050406030204" pitchFamily="18" charset="0"/>
-                            </a:rPr>
-                            <m:t>𝑟𝑒𝑣𝑒𝑟𝑡</m:t>
-                          </m:r>
-                        </m:den>
-                      </m:f>
-                    </m:oMath>
-                  </m:oMathPara>
-                </a14:m>
-                <a:endParaRPr lang="en-US" sz="1400" dirty="0"/>
-              </a:p>
-            </p:txBody>
-          </p:sp>
-        </mc:Choice>
-        <mc:Fallback>
-          <p:sp>
-            <p:nvSpPr>
-              <p:cNvPr id="3" name="TextBox 2">
-                <a:extLst>
-                  <a:ext uri="{FF2B5EF4-FFF2-40B4-BE49-F238E27FC236}">
-                    <a16:creationId xmlns:a16="http://schemas.microsoft.com/office/drawing/2014/main" id="{44D73A6A-B44D-4858-A7A5-FDFFB65723E5}"/>
-                  </a:ext>
-                </a:extLst>
-              </p:cNvPr>
-              <p:cNvSpPr txBox="1">
-                <a:spLocks noRot="1" noChangeAspect="1" noMove="1" noResize="1" noEditPoints="1" noAdjustHandles="1" noChangeArrowheads="1" noChangeShapeType="1" noTextEdit="1"/>
-              </p:cNvSpPr>
-              <p:nvPr/>
-            </p:nvSpPr>
-            <p:spPr>
-              <a:xfrm>
-                <a:off x="838200" y="4708763"/>
-                <a:ext cx="5817170" cy="409151"/>
-              </a:xfrm>
-              <a:prstGeom prst="rect">
-                <a:avLst/>
-              </a:prstGeom>
-              <a:blipFill>
-                <a:blip r:embed="rId6"/>
-                <a:stretch>
-                  <a:fillRect l="-314" t="-2941" r="-419" b="-13235"/>
-                </a:stretch>
-              </a:blipFill>
-            </p:spPr>
-            <p:txBody>
-              <a:bodyPr/>
-              <a:lstStyle/>
-              <a:p>
-                <a:r>
-                  <a:rPr lang="en-US">
-                    <a:noFill/>
-                  </a:rPr>
-                  <a:t> </a:t>
-                </a:r>
-              </a:p>
-            </p:txBody>
-          </p:sp>
-        </mc:Fallback>
-      </mc:AlternateContent>
-      <p:sp>
-        <p:nvSpPr>
-          <p:cNvPr id="6" name="TextBox 5">
-            <a:extLst>
-              <a:ext uri="{FF2B5EF4-FFF2-40B4-BE49-F238E27FC236}">
-                <a16:creationId xmlns:a16="http://schemas.microsoft.com/office/drawing/2014/main" id="{A45D8EDF-B7D9-4A8F-B0E6-91ACF9DCD5F8}"/>
-              </a:ext>
-            </a:extLst>
-          </p:cNvPr>
-          <p:cNvSpPr txBox="1"/>
-          <p:nvPr/>
-        </p:nvSpPr>
-        <p:spPr>
-          <a:xfrm>
-            <a:off x="8076593" y="3313652"/>
-            <a:ext cx="1882313" cy="646331"/>
-          </a:xfrm>
-          <a:prstGeom prst="rect">
-            <a:avLst/>
-          </a:prstGeom>
-          <a:noFill/>
-        </p:spPr>
-        <p:txBody>
-          <a:bodyPr wrap="square" rtlCol="0">
-            <a:spAutoFit/>
-          </a:bodyPr>
-          <a:lstStyle/>
-          <a:p>
-            <a:pPr algn="ctr"/>
-            <a:r>
-              <a:rPr lang="en-US" dirty="0">
-                <a:latin typeface="Tw Cen MT Condensed" panose="020B0606020104020203" pitchFamily="34" charset="0"/>
-              </a:rPr>
-              <a:t>Average views an article receives per day</a:t>
-            </a:r>
-          </a:p>
-        </p:txBody>
-      </p:sp>
-      <p:sp>
-        <p:nvSpPr>
-          <p:cNvPr id="11" name="TextBox 10">
-            <a:extLst>
-              <a:ext uri="{FF2B5EF4-FFF2-40B4-BE49-F238E27FC236}">
-                <a16:creationId xmlns:a16="http://schemas.microsoft.com/office/drawing/2014/main" id="{DC7F9595-22A6-4D97-9FA1-FFB00385E97A}"/>
-              </a:ext>
-            </a:extLst>
-          </p:cNvPr>
-          <p:cNvSpPr txBox="1"/>
-          <p:nvPr/>
-        </p:nvSpPr>
-        <p:spPr>
-          <a:xfrm>
-            <a:off x="2708737" y="3313652"/>
-            <a:ext cx="1882313" cy="646331"/>
-          </a:xfrm>
-          <a:prstGeom prst="rect">
-            <a:avLst/>
-          </a:prstGeom>
-          <a:noFill/>
-        </p:spPr>
-        <p:txBody>
-          <a:bodyPr wrap="square" rtlCol="0">
-            <a:spAutoFit/>
-          </a:bodyPr>
-          <a:lstStyle/>
-          <a:p>
-            <a:pPr algn="ctr"/>
-            <a:r>
-              <a:rPr lang="en-US" dirty="0">
-                <a:latin typeface="Tw Cen MT Condensed" panose="020B0606020104020203" pitchFamily="34" charset="0"/>
-              </a:rPr>
-              <a:t>Average time before vandalization is reverted</a:t>
-            </a:r>
-          </a:p>
-        </p:txBody>
-      </p:sp>
-    </p:spTree>
-    <p:extLst>
-      <p:ext uri="{BB962C8B-B14F-4D97-AF65-F5344CB8AC3E}">
-        <p14:creationId xmlns:p14="http://schemas.microsoft.com/office/powerpoint/2010/main" val="817223355"/>
-      </p:ext>
-    </p:extLst>
-  </p:cSld>
-  <p:clrMapOvr>
-    <a:masterClrMapping/>
-  </p:clrMapOvr>
-</p:sld>
-</file>
-
-<file path=ppt/slides/slide33.xml><?xml version="1.0" encoding="utf-8"?>
-<p:sld xmlns:a="http://schemas.openxmlformats.org/drawingml/2006/main" xmlns:r="http://schemas.openxmlformats.org/officeDocument/2006/relationships" xmlns:p="http://schemas.openxmlformats.org/presentationml/2006/main">
-  <p:cSld>
-    <p:spTree>
-      <p:nvGrpSpPr>
-        <p:cNvPr id="1" name=""/>
-        <p:cNvGrpSpPr/>
-        <p:nvPr/>
-      </p:nvGrpSpPr>
-      <p:grpSpPr>
-        <a:xfrm>
-          <a:off x="0" y="0"/>
-          <a:ext cx="0" cy="0"/>
-          <a:chOff x="0" y="0"/>
-          <a:chExt cx="0" cy="0"/>
-        </a:xfrm>
-      </p:grpSpPr>
-      <p:sp>
-        <p:nvSpPr>
-          <p:cNvPr id="2" name="Title 1">
-            <a:extLst>
-              <a:ext uri="{FF2B5EF4-FFF2-40B4-BE49-F238E27FC236}">
-                <a16:creationId xmlns:a16="http://schemas.microsoft.com/office/drawing/2014/main" id="{AB9F36FA-569C-48FC-8552-AE89D3A6F194}"/>
-              </a:ext>
-            </a:extLst>
-          </p:cNvPr>
-          <p:cNvSpPr>
-            <a:spLocks noGrp="1"/>
-          </p:cNvSpPr>
-          <p:nvPr>
-            <p:ph type="title"/>
-          </p:nvPr>
-        </p:nvSpPr>
-        <p:spPr/>
-        <p:txBody>
-          <a:bodyPr>
-            <a:normAutofit/>
-          </a:bodyPr>
-          <a:lstStyle/>
-          <a:p>
-            <a:r>
-              <a:rPr lang="en-US" sz="2800" dirty="0">
-                <a:latin typeface="Tw Cen MT" panose="020B0602020104020603" pitchFamily="34" charset="0"/>
-              </a:rPr>
-              <a:t>5. Analyze how many users will see the average vandalized Wikipedia 	page before the offending edit is reversed.</a:t>
-            </a:r>
-          </a:p>
-        </p:txBody>
-      </p:sp>
-      <p:pic>
-        <p:nvPicPr>
-          <p:cNvPr id="4" name="Picture 3" descr="Text&#10;&#10;Description automatically generated">
-            <a:extLst>
-              <a:ext uri="{FF2B5EF4-FFF2-40B4-BE49-F238E27FC236}">
-                <a16:creationId xmlns:a16="http://schemas.microsoft.com/office/drawing/2014/main" id="{E1656474-FD57-4C9C-8263-8EDC24DED887}"/>
-              </a:ext>
-            </a:extLst>
-          </p:cNvPr>
-          <p:cNvPicPr>
-            <a:picLocks noChangeAspect="1"/>
-          </p:cNvPicPr>
-          <p:nvPr/>
-        </p:nvPicPr>
-        <p:blipFill>
-          <a:blip r:embed="rId2">
-            <a:extLst>
-              <a:ext uri="{28A0092B-C50C-407E-A947-70E740481C1C}">
-                <a14:useLocalDpi xmlns:a14="http://schemas.microsoft.com/office/drawing/2010/main" val="0"/>
-              </a:ext>
-            </a:extLst>
-          </a:blip>
-          <a:stretch>
-            <a:fillRect/>
-          </a:stretch>
-        </p:blipFill>
-        <p:spPr>
-          <a:xfrm>
-            <a:off x="838200" y="1998346"/>
-            <a:ext cx="3752850" cy="666750"/>
-          </a:xfrm>
-          <a:prstGeom prst="rect">
-            <a:avLst/>
-          </a:prstGeom>
-        </p:spPr>
-      </p:pic>
-      <p:pic>
-        <p:nvPicPr>
-          <p:cNvPr id="8" name="Picture 7">
-            <a:extLst>
-              <a:ext uri="{FF2B5EF4-FFF2-40B4-BE49-F238E27FC236}">
-                <a16:creationId xmlns:a16="http://schemas.microsoft.com/office/drawing/2014/main" id="{86C70CBC-F5B3-4450-AD0B-D0F8E0C8635F}"/>
-              </a:ext>
-            </a:extLst>
-          </p:cNvPr>
-          <p:cNvPicPr>
-            <a:picLocks noChangeAspect="1"/>
-          </p:cNvPicPr>
-          <p:nvPr/>
-        </p:nvPicPr>
-        <p:blipFill>
-          <a:blip r:embed="rId3">
-            <a:extLst>
-              <a:ext uri="{28A0092B-C50C-407E-A947-70E740481C1C}">
-                <a14:useLocalDpi xmlns:a14="http://schemas.microsoft.com/office/drawing/2010/main" val="0"/>
-              </a:ext>
-            </a:extLst>
-          </a:blip>
-          <a:stretch>
-            <a:fillRect/>
-          </a:stretch>
-        </p:blipFill>
-        <p:spPr>
-          <a:xfrm>
-            <a:off x="838200" y="3274868"/>
-            <a:ext cx="1733550" cy="723900"/>
-          </a:xfrm>
-          <a:prstGeom prst="rect">
-            <a:avLst/>
-          </a:prstGeom>
-        </p:spPr>
-      </p:pic>
-      <p:pic>
-        <p:nvPicPr>
-          <p:cNvPr id="5" name="Picture 4">
-            <a:extLst>
-              <a:ext uri="{FF2B5EF4-FFF2-40B4-BE49-F238E27FC236}">
-                <a16:creationId xmlns:a16="http://schemas.microsoft.com/office/drawing/2014/main" id="{F598C2C4-3D8C-422C-BB05-B3FB3E6523EE}"/>
-              </a:ext>
-            </a:extLst>
-          </p:cNvPr>
-          <p:cNvPicPr>
-            <a:picLocks noChangeAspect="1"/>
-          </p:cNvPicPr>
-          <p:nvPr/>
-        </p:nvPicPr>
-        <p:blipFill>
-          <a:blip r:embed="rId4">
-            <a:extLst>
-              <a:ext uri="{28A0092B-C50C-407E-A947-70E740481C1C}">
-                <a14:useLocalDpi xmlns:a14="http://schemas.microsoft.com/office/drawing/2010/main" val="0"/>
-              </a:ext>
-            </a:extLst>
-          </a:blip>
-          <a:stretch>
-            <a:fillRect/>
-          </a:stretch>
-        </p:blipFill>
-        <p:spPr>
-          <a:xfrm>
-            <a:off x="5974166" y="1998346"/>
-            <a:ext cx="2371725" cy="361950"/>
-          </a:xfrm>
-          <a:prstGeom prst="rect">
-            <a:avLst/>
-          </a:prstGeom>
-        </p:spPr>
-      </p:pic>
-      <p:pic>
-        <p:nvPicPr>
-          <p:cNvPr id="7" name="Picture 6" descr="A picture containing text, device, meter&#10;&#10;Description automatically generated">
-            <a:extLst>
-              <a:ext uri="{FF2B5EF4-FFF2-40B4-BE49-F238E27FC236}">
-                <a16:creationId xmlns:a16="http://schemas.microsoft.com/office/drawing/2014/main" id="{A0C2D1AB-330E-435D-9F98-D33D70A2EDDE}"/>
-              </a:ext>
-            </a:extLst>
-          </p:cNvPr>
-          <p:cNvPicPr>
-            <a:picLocks noChangeAspect="1"/>
-          </p:cNvPicPr>
-          <p:nvPr/>
-        </p:nvPicPr>
-        <p:blipFill>
-          <a:blip r:embed="rId5">
-            <a:extLst>
-              <a:ext uri="{28A0092B-C50C-407E-A947-70E740481C1C}">
-                <a14:useLocalDpi xmlns:a14="http://schemas.microsoft.com/office/drawing/2010/main" val="0"/>
-              </a:ext>
-            </a:extLst>
-          </a:blip>
-          <a:stretch>
-            <a:fillRect/>
-          </a:stretch>
-        </p:blipFill>
-        <p:spPr>
-          <a:xfrm>
-            <a:off x="5974166" y="3270105"/>
-            <a:ext cx="1847850" cy="733425"/>
-          </a:xfrm>
-          <a:prstGeom prst="rect">
-            <a:avLst/>
-          </a:prstGeom>
-        </p:spPr>
-      </p:pic>
-      <mc:AlternateContent xmlns:mc="http://schemas.openxmlformats.org/markup-compatibility/2006">
-        <mc:Choice xmlns:a14="http://schemas.microsoft.com/office/drawing/2010/main" Requires="a14">
+      <mc:AlternateContent xmlns:mc="http://schemas.openxmlformats.org/markup-compatibility/2006" xmlns:a14="http://schemas.microsoft.com/office/drawing/2010/main">
+        <mc:Choice Requires="a14">
           <p:sp>
             <p:nvSpPr>
               <p:cNvPr id="3" name="TextBox 2">
@@ -9846,7 +9682,7 @@
             </p:txBody>
           </p:sp>
         </mc:Choice>
-        <mc:Fallback>
+        <mc:Fallback xmlns="">
           <p:sp>
             <p:nvSpPr>
               <p:cNvPr id="3" name="TextBox 2">
@@ -9891,8 +9727,613 @@
           </p:sp>
         </mc:Fallback>
       </mc:AlternateContent>
-      <mc:AlternateContent xmlns:mc="http://schemas.openxmlformats.org/markup-compatibility/2006">
-        <mc:Choice xmlns:a14="http://schemas.microsoft.com/office/drawing/2010/main" Requires="a14">
+      <p:sp>
+        <p:nvSpPr>
+          <p:cNvPr id="6" name="TextBox 5">
+            <a:extLst>
+              <a:ext uri="{FF2B5EF4-FFF2-40B4-BE49-F238E27FC236}">
+                <a16:creationId xmlns:a16="http://schemas.microsoft.com/office/drawing/2014/main" id="{A45D8EDF-B7D9-4A8F-B0E6-91ACF9DCD5F8}"/>
+              </a:ext>
+            </a:extLst>
+          </p:cNvPr>
+          <p:cNvSpPr txBox="1"/>
+          <p:nvPr/>
+        </p:nvSpPr>
+        <p:spPr>
+          <a:xfrm>
+            <a:off x="8076593" y="3313652"/>
+            <a:ext cx="1882313" cy="646331"/>
+          </a:xfrm>
+          <a:prstGeom prst="rect">
+            <a:avLst/>
+          </a:prstGeom>
+          <a:noFill/>
+        </p:spPr>
+        <p:txBody>
+          <a:bodyPr wrap="square" rtlCol="0">
+            <a:spAutoFit/>
+          </a:bodyPr>
+          <a:lstStyle/>
+          <a:p>
+            <a:pPr algn="ctr"/>
+            <a:r>
+              <a:rPr lang="en-US" dirty="0">
+                <a:latin typeface="Tw Cen MT Condensed" panose="020B0606020104020203" pitchFamily="34" charset="0"/>
+              </a:rPr>
+              <a:t>Average views an article receives per day</a:t>
+            </a:r>
+          </a:p>
+        </p:txBody>
+      </p:sp>
+      <p:sp>
+        <p:nvSpPr>
+          <p:cNvPr id="11" name="TextBox 10">
+            <a:extLst>
+              <a:ext uri="{FF2B5EF4-FFF2-40B4-BE49-F238E27FC236}">
+                <a16:creationId xmlns:a16="http://schemas.microsoft.com/office/drawing/2014/main" id="{DC7F9595-22A6-4D97-9FA1-FFB00385E97A}"/>
+              </a:ext>
+            </a:extLst>
+          </p:cNvPr>
+          <p:cNvSpPr txBox="1"/>
+          <p:nvPr/>
+        </p:nvSpPr>
+        <p:spPr>
+          <a:xfrm>
+            <a:off x="2708737" y="3313652"/>
+            <a:ext cx="1882313" cy="646331"/>
+          </a:xfrm>
+          <a:prstGeom prst="rect">
+            <a:avLst/>
+          </a:prstGeom>
+          <a:noFill/>
+        </p:spPr>
+        <p:txBody>
+          <a:bodyPr wrap="square" rtlCol="0">
+            <a:spAutoFit/>
+          </a:bodyPr>
+          <a:lstStyle/>
+          <a:p>
+            <a:pPr algn="ctr"/>
+            <a:r>
+              <a:rPr lang="en-US" dirty="0">
+                <a:latin typeface="Tw Cen MT Condensed" panose="020B0606020104020203" pitchFamily="34" charset="0"/>
+              </a:rPr>
+              <a:t>Average time before vandalization is reverted</a:t>
+            </a:r>
+          </a:p>
+        </p:txBody>
+      </p:sp>
+    </p:spTree>
+    <p:extLst>
+      <p:ext uri="{BB962C8B-B14F-4D97-AF65-F5344CB8AC3E}">
+        <p14:creationId xmlns:p14="http://schemas.microsoft.com/office/powerpoint/2010/main" val="817223355"/>
+      </p:ext>
+    </p:extLst>
+  </p:cSld>
+  <p:clrMapOvr>
+    <a:masterClrMapping/>
+  </p:clrMapOvr>
+</p:sld>
+</file>
+
+<file path=ppt/slides/slide33.xml><?xml version="1.0" encoding="utf-8"?>
+<p:sld xmlns:a="http://schemas.openxmlformats.org/drawingml/2006/main" xmlns:r="http://schemas.openxmlformats.org/officeDocument/2006/relationships" xmlns:p="http://schemas.openxmlformats.org/presentationml/2006/main">
+  <p:cSld>
+    <p:spTree>
+      <p:nvGrpSpPr>
+        <p:cNvPr id="1" name=""/>
+        <p:cNvGrpSpPr/>
+        <p:nvPr/>
+      </p:nvGrpSpPr>
+      <p:grpSpPr>
+        <a:xfrm>
+          <a:off x="0" y="0"/>
+          <a:ext cx="0" cy="0"/>
+          <a:chOff x="0" y="0"/>
+          <a:chExt cx="0" cy="0"/>
+        </a:xfrm>
+      </p:grpSpPr>
+      <p:sp>
+        <p:nvSpPr>
+          <p:cNvPr id="2" name="Title 1">
+            <a:extLst>
+              <a:ext uri="{FF2B5EF4-FFF2-40B4-BE49-F238E27FC236}">
+                <a16:creationId xmlns:a16="http://schemas.microsoft.com/office/drawing/2014/main" id="{AB9F36FA-569C-48FC-8552-AE89D3A6F194}"/>
+              </a:ext>
+            </a:extLst>
+          </p:cNvPr>
+          <p:cNvSpPr>
+            <a:spLocks noGrp="1"/>
+          </p:cNvSpPr>
+          <p:nvPr>
+            <p:ph type="title"/>
+          </p:nvPr>
+        </p:nvSpPr>
+        <p:spPr/>
+        <p:txBody>
+          <a:bodyPr>
+            <a:normAutofit/>
+          </a:bodyPr>
+          <a:lstStyle/>
+          <a:p>
+            <a:r>
+              <a:rPr lang="en-US" sz="2800" dirty="0">
+                <a:latin typeface="Tw Cen MT" panose="020B0602020104020603" pitchFamily="34" charset="0"/>
+              </a:rPr>
+              <a:t>5. Analyze how many users will see the average vandalized Wikipedia 	page before the offending edit is reversed.</a:t>
+            </a:r>
+          </a:p>
+        </p:txBody>
+      </p:sp>
+      <p:pic>
+        <p:nvPicPr>
+          <p:cNvPr id="4" name="Picture 3" descr="Text&#10;&#10;Description automatically generated">
+            <a:extLst>
+              <a:ext uri="{FF2B5EF4-FFF2-40B4-BE49-F238E27FC236}">
+                <a16:creationId xmlns:a16="http://schemas.microsoft.com/office/drawing/2014/main" id="{E1656474-FD57-4C9C-8263-8EDC24DED887}"/>
+              </a:ext>
+            </a:extLst>
+          </p:cNvPr>
+          <p:cNvPicPr>
+            <a:picLocks noChangeAspect="1"/>
+          </p:cNvPicPr>
+          <p:nvPr/>
+        </p:nvPicPr>
+        <p:blipFill>
+          <a:blip r:embed="rId2">
+            <a:extLst>
+              <a:ext uri="{28A0092B-C50C-407E-A947-70E740481C1C}">
+                <a14:useLocalDpi xmlns:a14="http://schemas.microsoft.com/office/drawing/2010/main" val="0"/>
+              </a:ext>
+            </a:extLst>
+          </a:blip>
+          <a:stretch>
+            <a:fillRect/>
+          </a:stretch>
+        </p:blipFill>
+        <p:spPr>
+          <a:xfrm>
+            <a:off x="838200" y="1998346"/>
+            <a:ext cx="3752850" cy="666750"/>
+          </a:xfrm>
+          <a:prstGeom prst="rect">
+            <a:avLst/>
+          </a:prstGeom>
+        </p:spPr>
+      </p:pic>
+      <p:pic>
+        <p:nvPicPr>
+          <p:cNvPr id="8" name="Picture 7">
+            <a:extLst>
+              <a:ext uri="{FF2B5EF4-FFF2-40B4-BE49-F238E27FC236}">
+                <a16:creationId xmlns:a16="http://schemas.microsoft.com/office/drawing/2014/main" id="{86C70CBC-F5B3-4450-AD0B-D0F8E0C8635F}"/>
+              </a:ext>
+            </a:extLst>
+          </p:cNvPr>
+          <p:cNvPicPr>
+            <a:picLocks noChangeAspect="1"/>
+          </p:cNvPicPr>
+          <p:nvPr/>
+        </p:nvPicPr>
+        <p:blipFill>
+          <a:blip r:embed="rId3">
+            <a:extLst>
+              <a:ext uri="{28A0092B-C50C-407E-A947-70E740481C1C}">
+                <a14:useLocalDpi xmlns:a14="http://schemas.microsoft.com/office/drawing/2010/main" val="0"/>
+              </a:ext>
+            </a:extLst>
+          </a:blip>
+          <a:stretch>
+            <a:fillRect/>
+          </a:stretch>
+        </p:blipFill>
+        <p:spPr>
+          <a:xfrm>
+            <a:off x="838200" y="3274868"/>
+            <a:ext cx="1733550" cy="723900"/>
+          </a:xfrm>
+          <a:prstGeom prst="rect">
+            <a:avLst/>
+          </a:prstGeom>
+        </p:spPr>
+      </p:pic>
+      <p:pic>
+        <p:nvPicPr>
+          <p:cNvPr id="5" name="Picture 4">
+            <a:extLst>
+              <a:ext uri="{FF2B5EF4-FFF2-40B4-BE49-F238E27FC236}">
+                <a16:creationId xmlns:a16="http://schemas.microsoft.com/office/drawing/2014/main" id="{F598C2C4-3D8C-422C-BB05-B3FB3E6523EE}"/>
+              </a:ext>
+            </a:extLst>
+          </p:cNvPr>
+          <p:cNvPicPr>
+            <a:picLocks noChangeAspect="1"/>
+          </p:cNvPicPr>
+          <p:nvPr/>
+        </p:nvPicPr>
+        <p:blipFill>
+          <a:blip r:embed="rId4">
+            <a:extLst>
+              <a:ext uri="{28A0092B-C50C-407E-A947-70E740481C1C}">
+                <a14:useLocalDpi xmlns:a14="http://schemas.microsoft.com/office/drawing/2010/main" val="0"/>
+              </a:ext>
+            </a:extLst>
+          </a:blip>
+          <a:stretch>
+            <a:fillRect/>
+          </a:stretch>
+        </p:blipFill>
+        <p:spPr>
+          <a:xfrm>
+            <a:off x="5974166" y="1998346"/>
+            <a:ext cx="2371725" cy="361950"/>
+          </a:xfrm>
+          <a:prstGeom prst="rect">
+            <a:avLst/>
+          </a:prstGeom>
+        </p:spPr>
+      </p:pic>
+      <p:pic>
+        <p:nvPicPr>
+          <p:cNvPr id="7" name="Picture 6" descr="A picture containing text, device, meter&#10;&#10;Description automatically generated">
+            <a:extLst>
+              <a:ext uri="{FF2B5EF4-FFF2-40B4-BE49-F238E27FC236}">
+                <a16:creationId xmlns:a16="http://schemas.microsoft.com/office/drawing/2014/main" id="{A0C2D1AB-330E-435D-9F98-D33D70A2EDDE}"/>
+              </a:ext>
+            </a:extLst>
+          </p:cNvPr>
+          <p:cNvPicPr>
+            <a:picLocks noChangeAspect="1"/>
+          </p:cNvPicPr>
+          <p:nvPr/>
+        </p:nvPicPr>
+        <p:blipFill>
+          <a:blip r:embed="rId5">
+            <a:extLst>
+              <a:ext uri="{28A0092B-C50C-407E-A947-70E740481C1C}">
+                <a14:useLocalDpi xmlns:a14="http://schemas.microsoft.com/office/drawing/2010/main" val="0"/>
+              </a:ext>
+            </a:extLst>
+          </a:blip>
+          <a:stretch>
+            <a:fillRect/>
+          </a:stretch>
+        </p:blipFill>
+        <p:spPr>
+          <a:xfrm>
+            <a:off x="5974166" y="3270105"/>
+            <a:ext cx="1847850" cy="733425"/>
+          </a:xfrm>
+          <a:prstGeom prst="rect">
+            <a:avLst/>
+          </a:prstGeom>
+        </p:spPr>
+      </p:pic>
+      <mc:AlternateContent xmlns:mc="http://schemas.openxmlformats.org/markup-compatibility/2006" xmlns:a14="http://schemas.microsoft.com/office/drawing/2010/main">
+        <mc:Choice Requires="a14">
+          <p:sp>
+            <p:nvSpPr>
+              <p:cNvPr id="3" name="TextBox 2">
+                <a:extLst>
+                  <a:ext uri="{FF2B5EF4-FFF2-40B4-BE49-F238E27FC236}">
+                    <a16:creationId xmlns:a16="http://schemas.microsoft.com/office/drawing/2014/main" id="{44D73A6A-B44D-4858-A7A5-FDFFB65723E5}"/>
+                  </a:ext>
+                </a:extLst>
+              </p:cNvPr>
+              <p:cNvSpPr txBox="1"/>
+              <p:nvPr/>
+            </p:nvSpPr>
+            <p:spPr>
+              <a:xfrm>
+                <a:off x="838200" y="4708763"/>
+                <a:ext cx="5817170" cy="409151"/>
+              </a:xfrm>
+              <a:prstGeom prst="rect">
+                <a:avLst/>
+              </a:prstGeom>
+              <a:noFill/>
+            </p:spPr>
+            <p:txBody>
+              <a:bodyPr wrap="none" lIns="0" tIns="0" rIns="0" bIns="0" rtlCol="0">
+                <a:spAutoFit/>
+              </a:bodyPr>
+              <a:lstStyle/>
+              <a:p>
+                <a:pPr/>
+                <a14:m>
+                  <m:oMathPara xmlns:m="http://schemas.openxmlformats.org/officeDocument/2006/math">
+                    <m:oMathParaPr>
+                      <m:jc m:val="centerGroup"/>
+                    </m:oMathParaPr>
+                    <m:oMath xmlns:m="http://schemas.openxmlformats.org/officeDocument/2006/math">
+                      <m:f>
+                        <m:fPr>
+                          <m:ctrlPr>
+                            <a:rPr lang="en-US" sz="1400" i="1" smtClean="0">
+                              <a:latin typeface="Cambria Math" panose="02040503050406030204" pitchFamily="18" charset="0"/>
+                            </a:rPr>
+                          </m:ctrlPr>
+                        </m:fPr>
+                        <m:num>
+                          <m:r>
+                            <a:rPr lang="en-US" sz="1400" b="0" i="1" smtClean="0">
+                              <a:latin typeface="Cambria Math" panose="02040503050406030204" pitchFamily="18" charset="0"/>
+                            </a:rPr>
+                            <m:t>96795.538 </m:t>
+                          </m:r>
+                          <m:r>
+                            <a:rPr lang="en-US" sz="1400" b="0" i="1" smtClean="0">
+                              <a:latin typeface="Cambria Math" panose="02040503050406030204" pitchFamily="18" charset="0"/>
+                            </a:rPr>
+                            <m:t>𝑠𝑒𝑐𝑜𝑛𝑑𝑠</m:t>
+                          </m:r>
+                        </m:num>
+                        <m:den>
+                          <m:r>
+                            <a:rPr lang="en-US" sz="1400" b="0" i="1" smtClean="0">
+                              <a:latin typeface="Cambria Math" panose="02040503050406030204" pitchFamily="18" charset="0"/>
+                            </a:rPr>
+                            <m:t>𝑟𝑒𝑣𝑒𝑟𝑡</m:t>
+                          </m:r>
+                        </m:den>
+                      </m:f>
+                      <m:r>
+                        <a:rPr lang="en-US" sz="1400" b="0" i="1" smtClean="0">
+                          <a:latin typeface="Cambria Math" panose="02040503050406030204" pitchFamily="18" charset="0"/>
+                        </a:rPr>
+                        <m:t> </m:t>
+                      </m:r>
+                      <m:r>
+                        <a:rPr lang="en-US" sz="1400" b="0" i="1" smtClean="0">
+                          <a:latin typeface="Cambria Math" panose="02040503050406030204" pitchFamily="18" charset="0"/>
+                        </a:rPr>
+                        <m:t>𝑥</m:t>
+                      </m:r>
+                      <m:r>
+                        <a:rPr lang="en-US" sz="1400" b="0" i="1" smtClean="0">
+                          <a:latin typeface="Cambria Math" panose="02040503050406030204" pitchFamily="18" charset="0"/>
+                        </a:rPr>
+                        <m:t> </m:t>
+                      </m:r>
+                      <m:f>
+                        <m:fPr>
+                          <m:ctrlPr>
+                            <a:rPr lang="en-US" sz="1400" b="0" i="1" smtClean="0">
+                              <a:latin typeface="Cambria Math" panose="02040503050406030204" pitchFamily="18" charset="0"/>
+                            </a:rPr>
+                          </m:ctrlPr>
+                        </m:fPr>
+                        <m:num>
+                          <m:r>
+                            <a:rPr lang="en-US" sz="1400" b="0" i="1" smtClean="0">
+                              <a:latin typeface="Cambria Math" panose="02040503050406030204" pitchFamily="18" charset="0"/>
+                            </a:rPr>
+                            <m:t>1 </m:t>
+                          </m:r>
+                          <m:r>
+                            <a:rPr lang="en-US" sz="1400" b="0" i="1" smtClean="0">
+                              <a:latin typeface="Cambria Math" panose="02040503050406030204" pitchFamily="18" charset="0"/>
+                            </a:rPr>
+                            <m:t>𝑚𝑖𝑛𝑢𝑡𝑒</m:t>
+                          </m:r>
+                        </m:num>
+                        <m:den>
+                          <m:r>
+                            <a:rPr lang="en-US" sz="1400" b="0" i="1" smtClean="0">
+                              <a:latin typeface="Cambria Math" panose="02040503050406030204" pitchFamily="18" charset="0"/>
+                            </a:rPr>
+                            <m:t>60 </m:t>
+                          </m:r>
+                          <m:r>
+                            <a:rPr lang="en-US" sz="1400" b="0" i="1" smtClean="0">
+                              <a:latin typeface="Cambria Math" panose="02040503050406030204" pitchFamily="18" charset="0"/>
+                            </a:rPr>
+                            <m:t>𝑠𝑒𝑐𝑜𝑛𝑑𝑠</m:t>
+                          </m:r>
+                        </m:den>
+                      </m:f>
+                      <m:r>
+                        <a:rPr lang="en-US" sz="1400" b="0" i="1" smtClean="0">
+                          <a:latin typeface="Cambria Math" panose="02040503050406030204" pitchFamily="18" charset="0"/>
+                        </a:rPr>
+                        <m:t> </m:t>
+                      </m:r>
+                      <m:r>
+                        <a:rPr lang="en-US" sz="1400" b="0" i="1" smtClean="0">
+                          <a:latin typeface="Cambria Math" panose="02040503050406030204" pitchFamily="18" charset="0"/>
+                        </a:rPr>
+                        <m:t>𝑥</m:t>
+                      </m:r>
+                      <m:r>
+                        <a:rPr lang="en-US" sz="1400" b="0" i="1" smtClean="0">
+                          <a:latin typeface="Cambria Math" panose="02040503050406030204" pitchFamily="18" charset="0"/>
+                        </a:rPr>
+                        <m:t> </m:t>
+                      </m:r>
+                      <m:f>
+                        <m:fPr>
+                          <m:ctrlPr>
+                            <a:rPr lang="en-US" sz="1400" b="0" i="1" smtClean="0">
+                              <a:latin typeface="Cambria Math" panose="02040503050406030204" pitchFamily="18" charset="0"/>
+                            </a:rPr>
+                          </m:ctrlPr>
+                        </m:fPr>
+                        <m:num>
+                          <m:r>
+                            <a:rPr lang="en-US" sz="1400" b="0" i="1" smtClean="0">
+                              <a:latin typeface="Cambria Math" panose="02040503050406030204" pitchFamily="18" charset="0"/>
+                            </a:rPr>
+                            <m:t>1 </m:t>
+                          </m:r>
+                          <m:r>
+                            <a:rPr lang="en-US" sz="1400" b="0" i="1" smtClean="0">
+                              <a:latin typeface="Cambria Math" panose="02040503050406030204" pitchFamily="18" charset="0"/>
+                            </a:rPr>
+                            <m:t>h𝑜𝑢𝑟</m:t>
+                          </m:r>
+                        </m:num>
+                        <m:den>
+                          <m:r>
+                            <a:rPr lang="en-US" sz="1400" b="0" i="1" smtClean="0">
+                              <a:latin typeface="Cambria Math" panose="02040503050406030204" pitchFamily="18" charset="0"/>
+                            </a:rPr>
+                            <m:t>60 </m:t>
+                          </m:r>
+                          <m:r>
+                            <a:rPr lang="en-US" sz="1400" b="0" i="1" smtClean="0">
+                              <a:latin typeface="Cambria Math" panose="02040503050406030204" pitchFamily="18" charset="0"/>
+                            </a:rPr>
+                            <m:t>𝑚𝑖𝑛𝑢𝑡𝑒𝑠</m:t>
+                          </m:r>
+                        </m:den>
+                      </m:f>
+                      <m:r>
+                        <a:rPr lang="en-US" sz="1400" b="0" i="1" smtClean="0">
+                          <a:latin typeface="Cambria Math" panose="02040503050406030204" pitchFamily="18" charset="0"/>
+                        </a:rPr>
+                        <m:t> </m:t>
+                      </m:r>
+                      <m:r>
+                        <a:rPr lang="en-US" sz="1400" b="0" i="1" smtClean="0">
+                          <a:latin typeface="Cambria Math" panose="02040503050406030204" pitchFamily="18" charset="0"/>
+                        </a:rPr>
+                        <m:t>𝑥</m:t>
+                      </m:r>
+                      <m:r>
+                        <a:rPr lang="en-US" sz="1400" b="0" i="1" smtClean="0">
+                          <a:latin typeface="Cambria Math" panose="02040503050406030204" pitchFamily="18" charset="0"/>
+                        </a:rPr>
+                        <m:t> </m:t>
+                      </m:r>
+                      <m:f>
+                        <m:fPr>
+                          <m:ctrlPr>
+                            <a:rPr lang="en-US" sz="1400" b="0" i="1" smtClean="0">
+                              <a:latin typeface="Cambria Math" panose="02040503050406030204" pitchFamily="18" charset="0"/>
+                            </a:rPr>
+                          </m:ctrlPr>
+                        </m:fPr>
+                        <m:num>
+                          <m:r>
+                            <a:rPr lang="en-US" sz="1400" b="0" i="1" smtClean="0">
+                              <a:latin typeface="Cambria Math" panose="02040503050406030204" pitchFamily="18" charset="0"/>
+                            </a:rPr>
+                            <m:t>1 </m:t>
+                          </m:r>
+                          <m:r>
+                            <a:rPr lang="en-US" sz="1400" b="0" i="1" smtClean="0">
+                              <a:latin typeface="Cambria Math" panose="02040503050406030204" pitchFamily="18" charset="0"/>
+                            </a:rPr>
+                            <m:t>𝑑𝑎𝑦</m:t>
+                          </m:r>
+                        </m:num>
+                        <m:den>
+                          <m:r>
+                            <a:rPr lang="en-US" sz="1400" b="0" i="1" smtClean="0">
+                              <a:latin typeface="Cambria Math" panose="02040503050406030204" pitchFamily="18" charset="0"/>
+                            </a:rPr>
+                            <m:t>24 </m:t>
+                          </m:r>
+                          <m:r>
+                            <a:rPr lang="en-US" sz="1400" b="0" i="1" smtClean="0">
+                              <a:latin typeface="Cambria Math" panose="02040503050406030204" pitchFamily="18" charset="0"/>
+                            </a:rPr>
+                            <m:t>h𝑜𝑢𝑟𝑠</m:t>
+                          </m:r>
+                        </m:den>
+                      </m:f>
+                      <m:r>
+                        <a:rPr lang="en-US" sz="1400" b="0" i="1" smtClean="0">
+                          <a:latin typeface="Cambria Math" panose="02040503050406030204" pitchFamily="18" charset="0"/>
+                        </a:rPr>
+                        <m:t>= </m:t>
+                      </m:r>
+                      <m:f>
+                        <m:fPr>
+                          <m:ctrlPr>
+                            <a:rPr lang="en-US" sz="1400" b="0" i="1" smtClean="0">
+                              <a:latin typeface="Cambria Math" panose="02040503050406030204" pitchFamily="18" charset="0"/>
+                            </a:rPr>
+                          </m:ctrlPr>
+                        </m:fPr>
+                        <m:num>
+                          <m:r>
+                            <a:rPr lang="en-US" sz="1400" b="0" i="1" smtClean="0">
+                              <a:latin typeface="Cambria Math" panose="02040503050406030204" pitchFamily="18" charset="0"/>
+                            </a:rPr>
+                            <m:t>1.12 </m:t>
+                          </m:r>
+                          <m:r>
+                            <a:rPr lang="en-US" sz="1400" b="0" i="1" smtClean="0">
+                              <a:latin typeface="Cambria Math" panose="02040503050406030204" pitchFamily="18" charset="0"/>
+                            </a:rPr>
+                            <m:t>𝑑𝑎𝑦𝑠</m:t>
+                          </m:r>
+                        </m:num>
+                        <m:den>
+                          <m:r>
+                            <a:rPr lang="en-US" sz="1400" b="0" i="1" smtClean="0">
+                              <a:latin typeface="Cambria Math" panose="02040503050406030204" pitchFamily="18" charset="0"/>
+                            </a:rPr>
+                            <m:t>𝑟𝑒𝑣𝑒𝑟𝑡</m:t>
+                          </m:r>
+                        </m:den>
+                      </m:f>
+                    </m:oMath>
+                  </m:oMathPara>
+                </a14:m>
+                <a:endParaRPr lang="en-US" sz="1400" dirty="0"/>
+              </a:p>
+            </p:txBody>
+          </p:sp>
+        </mc:Choice>
+        <mc:Fallback xmlns="">
+          <p:sp>
+            <p:nvSpPr>
+              <p:cNvPr id="3" name="TextBox 2">
+                <a:extLst>
+                  <a:ext uri="{FF2B5EF4-FFF2-40B4-BE49-F238E27FC236}">
+                    <a16:creationId xmlns:a16="http://schemas.microsoft.com/office/drawing/2014/main" id="{44D73A6A-B44D-4858-A7A5-FDFFB65723E5}"/>
+                  </a:ext>
+                </a:extLst>
+              </p:cNvPr>
+              <p:cNvSpPr txBox="1">
+                <a:spLocks noRot="1" noChangeAspect="1" noMove="1" noResize="1" noEditPoints="1" noAdjustHandles="1" noChangeArrowheads="1" noChangeShapeType="1" noTextEdit="1"/>
+              </p:cNvSpPr>
+              <p:nvPr/>
+            </p:nvSpPr>
+            <p:spPr>
+              <a:xfrm>
+                <a:off x="838200" y="4708763"/>
+                <a:ext cx="5817170" cy="409151"/>
+              </a:xfrm>
+              <a:prstGeom prst="rect">
+                <a:avLst/>
+              </a:prstGeom>
+              <a:blipFill>
+                <a:blip r:embed="rId6"/>
+                <a:stretch>
+                  <a:fillRect l="-314" t="-2941" r="-419" b="-13235"/>
+                </a:stretch>
+              </a:blipFill>
+            </p:spPr>
+            <p:txBody>
+              <a:bodyPr/>
+              <a:lstStyle/>
+              <a:p>
+                <a:r>
+                  <a:rPr lang="en-US">
+                    <a:noFill/>
+                  </a:rPr>
+                  <a:t> </a:t>
+                </a:r>
+              </a:p>
+            </p:txBody>
+          </p:sp>
+        </mc:Fallback>
+      </mc:AlternateContent>
+      <mc:AlternateContent xmlns:mc="http://schemas.openxmlformats.org/markup-compatibility/2006" xmlns:a14="http://schemas.microsoft.com/office/drawing/2010/main">
+        <mc:Choice Requires="a14">
           <p:sp>
             <p:nvSpPr>
               <p:cNvPr id="6" name="TextBox 5">
@@ -9941,25 +10382,13 @@
                             <a:rPr lang="en-US" sz="1400" b="0" i="1" smtClean="0">
                               <a:latin typeface="Cambria Math" panose="02040503050406030204" pitchFamily="18" charset="0"/>
                             </a:rPr>
-                            <m:t>1.12</m:t>
+                            <m:t>1.12 </m:t>
                           </m:r>
                           <m:r>
                             <a:rPr lang="en-US" sz="1400" b="0" i="1" smtClean="0">
                               <a:latin typeface="Cambria Math" panose="02040503050406030204" pitchFamily="18" charset="0"/>
                             </a:rPr>
-                            <m:t> </m:t>
-                          </m:r>
-                          <m:r>
-                            <a:rPr lang="en-US" sz="1400" b="0" i="1" smtClean="0">
-                              <a:latin typeface="Cambria Math" panose="02040503050406030204" pitchFamily="18" charset="0"/>
-                            </a:rPr>
-                            <m:t>𝑑𝑎𝑦</m:t>
-                          </m:r>
-                          <m:r>
-                            <a:rPr lang="en-US" sz="1400" b="0" i="1" smtClean="0">
-                              <a:latin typeface="Cambria Math" panose="02040503050406030204" pitchFamily="18" charset="0"/>
-                            </a:rPr>
-                            <m:t>𝑠</m:t>
+                            <m:t>𝑑𝑎𝑦𝑠</m:t>
                           </m:r>
                         </m:num>
                         <m:den>
@@ -10002,13 +10431,7 @@
                             <a:rPr lang="en-US" sz="1400" b="0" i="1" smtClean="0">
                               <a:latin typeface="Cambria Math" panose="02040503050406030204" pitchFamily="18" charset="0"/>
                             </a:rPr>
-                            <m:t>38.663</m:t>
-                          </m:r>
-                          <m:r>
-                            <a:rPr lang="en-US" sz="1400" b="0" i="1" smtClean="0">
-                              <a:latin typeface="Cambria Math" panose="02040503050406030204" pitchFamily="18" charset="0"/>
-                            </a:rPr>
-                            <m:t> </m:t>
+                            <m:t>38.663 </m:t>
                           </m:r>
                           <m:r>
                             <a:rPr lang="en-US" sz="1400" b="0" i="1" smtClean="0">
@@ -10045,13 +10468,7 @@
                             <a:rPr lang="en-US" sz="1400" b="0" i="1" smtClean="0">
                               <a:latin typeface="Cambria Math" panose="02040503050406030204" pitchFamily="18" charset="0"/>
                             </a:rPr>
-                            <m:t>43.303</m:t>
-                          </m:r>
-                          <m:r>
-                            <a:rPr lang="en-US" sz="1400" b="0" i="1" smtClean="0">
-                              <a:latin typeface="Cambria Math" panose="02040503050406030204" pitchFamily="18" charset="0"/>
-                            </a:rPr>
-                            <m:t> </m:t>
+                            <m:t>43.303 </m:t>
                           </m:r>
                           <m:r>
                             <a:rPr lang="en-US" sz="1400" b="0" i="1" smtClean="0">
@@ -10077,7 +10494,7 @@
             </p:txBody>
           </p:sp>
         </mc:Choice>
-        <mc:Fallback>
+        <mc:Fallback xmlns="">
           <p:sp>
             <p:nvSpPr>
               <p:cNvPr id="6" name="TextBox 5">
@@ -10846,6 +11263,171 @@
               </a:rPr>
               <a:t>Format of MapReduce output</a:t>
             </a:r>
+          </a:p>
+        </p:txBody>
+      </p:sp>
+      <p:sp>
+        <p:nvSpPr>
+          <p:cNvPr id="4" name="Rectangle: Rounded Corners 3">
+            <a:extLst>
+              <a:ext uri="{FF2B5EF4-FFF2-40B4-BE49-F238E27FC236}">
+                <a16:creationId xmlns:a16="http://schemas.microsoft.com/office/drawing/2014/main" id="{47F2D71D-D7B0-41EA-8365-27E49B60800A}"/>
+              </a:ext>
+            </a:extLst>
+          </p:cNvPr>
+          <p:cNvSpPr/>
+          <p:nvPr/>
+        </p:nvSpPr>
+        <p:spPr>
+          <a:xfrm>
+            <a:off x="8929746" y="3268310"/>
+            <a:ext cx="325206" cy="141560"/>
+          </a:xfrm>
+          <a:prstGeom prst="roundRect">
+            <a:avLst/>
+          </a:prstGeom>
+          <a:solidFill>
+            <a:schemeClr val="accent3">
+              <a:lumMod val="60000"/>
+              <a:lumOff val="40000"/>
+            </a:schemeClr>
+          </a:solidFill>
+          <a:effectLst>
+            <a:softEdge rad="31750"/>
+          </a:effectLst>
+        </p:spPr>
+        <p:style>
+          <a:lnRef idx="2">
+            <a:schemeClr val="accent1">
+              <a:shade val="50000"/>
+            </a:schemeClr>
+          </a:lnRef>
+          <a:fillRef idx="1">
+            <a:schemeClr val="accent1"/>
+          </a:fillRef>
+          <a:effectRef idx="0">
+            <a:schemeClr val="accent1"/>
+          </a:effectRef>
+          <a:fontRef idx="minor">
+            <a:schemeClr val="lt1"/>
+          </a:fontRef>
+        </p:style>
+        <p:txBody>
+          <a:bodyPr rtlCol="0" anchor="ctr"/>
+          <a:lstStyle/>
+          <a:p>
+            <a:pPr algn="ctr"/>
+            <a:endParaRPr lang="en-US"/>
+          </a:p>
+        </p:txBody>
+      </p:sp>
+      <p:sp>
+        <p:nvSpPr>
+          <p:cNvPr id="6" name="Rectangle: Rounded Corners 5">
+            <a:extLst>
+              <a:ext uri="{FF2B5EF4-FFF2-40B4-BE49-F238E27FC236}">
+                <a16:creationId xmlns:a16="http://schemas.microsoft.com/office/drawing/2014/main" id="{442222DD-676C-4769-A649-58E6080979F9}"/>
+              </a:ext>
+            </a:extLst>
+          </p:cNvPr>
+          <p:cNvSpPr/>
+          <p:nvPr/>
+        </p:nvSpPr>
+        <p:spPr>
+          <a:xfrm>
+            <a:off x="8932932" y="3420710"/>
+            <a:ext cx="325206" cy="141560"/>
+          </a:xfrm>
+          <a:prstGeom prst="roundRect">
+            <a:avLst/>
+          </a:prstGeom>
+          <a:solidFill>
+            <a:schemeClr val="accent3">
+              <a:lumMod val="60000"/>
+              <a:lumOff val="40000"/>
+            </a:schemeClr>
+          </a:solidFill>
+          <a:effectLst>
+            <a:softEdge rad="31750"/>
+          </a:effectLst>
+        </p:spPr>
+        <p:style>
+          <a:lnRef idx="2">
+            <a:schemeClr val="accent1">
+              <a:shade val="50000"/>
+            </a:schemeClr>
+          </a:lnRef>
+          <a:fillRef idx="1">
+            <a:schemeClr val="accent1"/>
+          </a:fillRef>
+          <a:effectRef idx="0">
+            <a:schemeClr val="accent1"/>
+          </a:effectRef>
+          <a:fontRef idx="minor">
+            <a:schemeClr val="lt1"/>
+          </a:fontRef>
+        </p:style>
+        <p:txBody>
+          <a:bodyPr rtlCol="0" anchor="ctr"/>
+          <a:lstStyle/>
+          <a:p>
+            <a:pPr algn="ctr"/>
+            <a:endParaRPr lang="en-US"/>
+          </a:p>
+        </p:txBody>
+      </p:sp>
+      <p:sp>
+        <p:nvSpPr>
+          <p:cNvPr id="11" name="Rectangle: Rounded Corners 10">
+            <a:extLst>
+              <a:ext uri="{FF2B5EF4-FFF2-40B4-BE49-F238E27FC236}">
+                <a16:creationId xmlns:a16="http://schemas.microsoft.com/office/drawing/2014/main" id="{0BAC8DF6-A73C-47D2-8B8F-EDFD5AF1A71F}"/>
+              </a:ext>
+            </a:extLst>
+          </p:cNvPr>
+          <p:cNvSpPr/>
+          <p:nvPr/>
+        </p:nvSpPr>
+        <p:spPr>
+          <a:xfrm>
+            <a:off x="8932292" y="3576936"/>
+            <a:ext cx="325206" cy="141560"/>
+          </a:xfrm>
+          <a:prstGeom prst="roundRect">
+            <a:avLst/>
+          </a:prstGeom>
+          <a:solidFill>
+            <a:schemeClr val="accent3">
+              <a:lumMod val="60000"/>
+              <a:lumOff val="40000"/>
+            </a:schemeClr>
+          </a:solidFill>
+          <a:effectLst>
+            <a:softEdge rad="31750"/>
+          </a:effectLst>
+        </p:spPr>
+        <p:style>
+          <a:lnRef idx="2">
+            <a:schemeClr val="accent1">
+              <a:shade val="50000"/>
+            </a:schemeClr>
+          </a:lnRef>
+          <a:fillRef idx="1">
+            <a:schemeClr val="accent1"/>
+          </a:fillRef>
+          <a:effectRef idx="0">
+            <a:schemeClr val="accent1"/>
+          </a:effectRef>
+          <a:fontRef idx="minor">
+            <a:schemeClr val="lt1"/>
+          </a:fontRef>
+        </p:style>
+        <p:txBody>
+          <a:bodyPr rtlCol="0" anchor="ctr"/>
+          <a:lstStyle/>
+          <a:p>
+            <a:pPr algn="ctr"/>
+            <a:endParaRPr lang="en-US"/>
           </a:p>
         </p:txBody>
       </p:sp>

</xml_diff>